<commit_message>
cambiati nomi tabelle e attributi db
</commit_message>
<xml_diff>
--- a/revisione_1/schema E-R.pptx
+++ b/revisione_1/schema E-R.pptx
@@ -4194,7 +4194,7 @@
                   <a:latin typeface="Times New Roman" pitchFamily="18" charset="0"/>
                   <a:cs typeface="Times New Roman" pitchFamily="18" charset="0"/>
                 </a:rPr>
-                <a:t>IdCategoria</a:t>
+                <a:t>Id Categoria</a:t>
               </a:r>
             </a:p>
           </p:txBody>
@@ -4455,7 +4455,7 @@
                   <a:latin typeface="Times New Roman" pitchFamily="18" charset="0"/>
                   <a:cs typeface="Times New Roman" pitchFamily="18" charset="0"/>
                 </a:rPr>
-                <a:t>IdProdotto</a:t>
+                <a:t>Id Prodotto</a:t>
               </a:r>
             </a:p>
           </p:txBody>
@@ -5536,8 +5536,8 @@
         </p:nvSpPr>
         <p:spPr>
           <a:xfrm>
-            <a:off x="5580099" y="3438269"/>
-            <a:ext cx="589477" cy="184666"/>
+            <a:off x="5653840" y="3353673"/>
+            <a:ext cx="589477" cy="276999"/>
           </a:xfrm>
           <a:prstGeom prst="rect">
             <a:avLst/>
@@ -5552,12 +5552,16 @@
           <a:p>
             <a:pPr algn="ctr"/>
             <a:r>
-              <a:rPr lang="it-IT" sz="600" dirty="0">
+              <a:rPr lang="it-IT" sz="600" dirty="0" err="1">
                 <a:latin typeface="Times New Roman" pitchFamily="18" charset="0"/>
                 <a:cs typeface="Times New Roman" pitchFamily="18" charset="0"/>
               </a:rPr>
-              <a:t>DescrBreve</a:t>
-            </a:r>
+              <a:t>DescrizioneBreve</a:t>
+            </a:r>
+            <a:endParaRPr lang="it-IT" sz="600" dirty="0">
+              <a:latin typeface="Times New Roman" pitchFamily="18" charset="0"/>
+              <a:cs typeface="Times New Roman" pitchFamily="18" charset="0"/>
+            </a:endParaRPr>
           </a:p>
         </p:txBody>
       </p:sp>
@@ -5575,8 +5579,8 @@
         </p:nvSpPr>
         <p:spPr>
           <a:xfrm>
-            <a:off x="5922204" y="3673980"/>
-            <a:ext cx="671574" cy="184666"/>
+            <a:off x="5910460" y="3641630"/>
+            <a:ext cx="671574" cy="276999"/>
           </a:xfrm>
           <a:prstGeom prst="rect">
             <a:avLst/>
@@ -5595,7 +5599,17 @@
                 <a:latin typeface="Times New Roman" pitchFamily="18" charset="0"/>
                 <a:cs typeface="Times New Roman" pitchFamily="18" charset="0"/>
               </a:rPr>
-              <a:t>DescrEstesa</a:t>
+              <a:t>Descrizione</a:t>
+            </a:r>
+          </a:p>
+          <a:p>
+            <a:pPr algn="ctr"/>
+            <a:r>
+              <a:rPr lang="it-IT" sz="600" dirty="0">
+                <a:latin typeface="Times New Roman" pitchFamily="18" charset="0"/>
+                <a:cs typeface="Times New Roman" pitchFamily="18" charset="0"/>
+              </a:rPr>
+              <a:t>Estesa</a:t>
             </a:r>
           </a:p>
         </p:txBody>
@@ -5653,8 +5667,8 @@
         </p:nvSpPr>
         <p:spPr>
           <a:xfrm>
-            <a:off x="4157326" y="3493260"/>
-            <a:ext cx="630293" cy="184666"/>
+            <a:off x="4170121" y="3447966"/>
+            <a:ext cx="630293" cy="276999"/>
           </a:xfrm>
           <a:prstGeom prst="rect">
             <a:avLst/>
@@ -5673,7 +5687,7 @@
                 <a:latin typeface="Times New Roman" pitchFamily="18" charset="0"/>
                 <a:cs typeface="Times New Roman" pitchFamily="18" charset="0"/>
               </a:rPr>
-              <a:t>PercSconto</a:t>
+              <a:t>Percentuale Sconto</a:t>
             </a:r>
           </a:p>
         </p:txBody>
@@ -5708,11 +5722,18 @@
           <a:p>
             <a:pPr algn="ctr"/>
             <a:r>
+              <a:rPr lang="it-IT" sz="600" dirty="0" err="1">
+                <a:latin typeface="Times New Roman" pitchFamily="18" charset="0"/>
+                <a:cs typeface="Times New Roman" pitchFamily="18" charset="0"/>
+              </a:rPr>
+              <a:t>Flag</a:t>
+            </a:r>
+            <a:r>
               <a:rPr lang="it-IT" sz="600" dirty="0">
                 <a:latin typeface="Times New Roman" pitchFamily="18" charset="0"/>
                 <a:cs typeface="Times New Roman" pitchFamily="18" charset="0"/>
               </a:rPr>
-              <a:t>FlagSconto</a:t>
+              <a:t> Sconto</a:t>
             </a:r>
           </a:p>
         </p:txBody>
@@ -6893,8 +6914,8 @@
         </p:nvSpPr>
         <p:spPr>
           <a:xfrm>
-            <a:off x="6662538" y="3695309"/>
-            <a:ext cx="801481" cy="184666"/>
+            <a:off x="6739898" y="3656035"/>
+            <a:ext cx="801481" cy="276999"/>
           </a:xfrm>
           <a:prstGeom prst="rect">
             <a:avLst/>
@@ -6913,7 +6934,17 @@
                 <a:latin typeface="Times New Roman" pitchFamily="18" charset="0"/>
                 <a:cs typeface="Times New Roman" pitchFamily="18" charset="0"/>
               </a:rPr>
-              <a:t>TipologiaUtente</a:t>
+              <a:t>Tipologia </a:t>
+            </a:r>
+          </a:p>
+          <a:p>
+            <a:pPr algn="ctr"/>
+            <a:r>
+              <a:rPr lang="it-IT" sz="600" dirty="0">
+                <a:latin typeface="Times New Roman" pitchFamily="18" charset="0"/>
+                <a:cs typeface="Times New Roman" pitchFamily="18" charset="0"/>
+              </a:rPr>
+              <a:t>Utente</a:t>
             </a:r>
           </a:p>
         </p:txBody>
@@ -7541,7 +7572,7 @@
                 <a:latin typeface="Times New Roman" pitchFamily="18" charset="0"/>
                 <a:cs typeface="Times New Roman" pitchFamily="18" charset="0"/>
               </a:rPr>
-              <a:t>DataNascita</a:t>
+              <a:t>Data Nascita</a:t>
             </a:r>
           </a:p>
         </p:txBody>
@@ -7816,7 +7847,7 @@
                 <a:latin typeface="Times New Roman" pitchFamily="18" charset="0"/>
                 <a:cs typeface="Times New Roman" pitchFamily="18" charset="0"/>
               </a:rPr>
-              <a:t>IdSottocategoria</a:t>
+              <a:t>Id Sottocategoria</a:t>
             </a:r>
           </a:p>
         </p:txBody>

</xml_diff>

<commit_message>
aggiunto il campo email per gli utenti
</commit_message>
<xml_diff>
--- a/revisione_1/schema E-R.pptx
+++ b/revisione_1/schema E-R.pptx
@@ -226,7 +226,7 @@
             <a:fld id="{DF8E4867-69EA-41F6-8C06-E5B3EDBB3F96}" type="datetimeFigureOut">
               <a:rPr lang="it-IT" smtClean="0"/>
               <a:pPr/>
-              <a:t>22/05/20</a:t>
+              <a:t>04/06/20</a:t>
             </a:fld>
             <a:endParaRPr lang="it-IT" dirty="0"/>
           </a:p>
@@ -388,7 +388,7 @@
             <a:fld id="{C28A59B8-8CA0-4427-80CD-4F99FE62DFCE}" type="datetimeFigureOut">
               <a:rPr lang="it-IT" smtClean="0"/>
               <a:pPr/>
-              <a:t>22/05/20</a:t>
+              <a:t>04/06/20</a:t>
             </a:fld>
             <a:endParaRPr lang="it-IT" dirty="0"/>
           </a:p>
@@ -833,7 +833,7 @@
             <a:fld id="{4B6055F8-1D02-4417-9241-55C834FD9970}" type="datetimeFigureOut">
               <a:rPr lang="it-IT" smtClean="0"/>
               <a:pPr/>
-              <a:t>22/05/20</a:t>
+              <a:t>04/06/20</a:t>
             </a:fld>
             <a:endParaRPr lang="it-IT" dirty="0"/>
           </a:p>
@@ -998,7 +998,7 @@
             <a:fld id="{4B6055F8-1D02-4417-9241-55C834FD9970}" type="datetimeFigureOut">
               <a:rPr lang="it-IT" smtClean="0"/>
               <a:pPr/>
-              <a:t>22/05/20</a:t>
+              <a:t>04/06/20</a:t>
             </a:fld>
             <a:endParaRPr lang="it-IT" dirty="0"/>
           </a:p>
@@ -1173,7 +1173,7 @@
             <a:fld id="{4B6055F8-1D02-4417-9241-55C834FD9970}" type="datetimeFigureOut">
               <a:rPr lang="it-IT" smtClean="0"/>
               <a:pPr/>
-              <a:t>22/05/20</a:t>
+              <a:t>04/06/20</a:t>
             </a:fld>
             <a:endParaRPr lang="it-IT" dirty="0"/>
           </a:p>
@@ -1338,7 +1338,7 @@
             <a:fld id="{4B6055F8-1D02-4417-9241-55C834FD9970}" type="datetimeFigureOut">
               <a:rPr lang="it-IT" smtClean="0"/>
               <a:pPr/>
-              <a:t>22/05/20</a:t>
+              <a:t>04/06/20</a:t>
             </a:fld>
             <a:endParaRPr lang="it-IT" dirty="0"/>
           </a:p>
@@ -1580,7 +1580,7 @@
             <a:fld id="{4B6055F8-1D02-4417-9241-55C834FD9970}" type="datetimeFigureOut">
               <a:rPr lang="it-IT" smtClean="0"/>
               <a:pPr/>
-              <a:t>22/05/20</a:t>
+              <a:t>04/06/20</a:t>
             </a:fld>
             <a:endParaRPr lang="it-IT" dirty="0"/>
           </a:p>
@@ -1862,7 +1862,7 @@
             <a:fld id="{4B6055F8-1D02-4417-9241-55C834FD9970}" type="datetimeFigureOut">
               <a:rPr lang="it-IT" smtClean="0"/>
               <a:pPr/>
-              <a:t>22/05/20</a:t>
+              <a:t>04/06/20</a:t>
             </a:fld>
             <a:endParaRPr lang="it-IT" dirty="0"/>
           </a:p>
@@ -2278,7 +2278,7 @@
             <a:fld id="{4B6055F8-1D02-4417-9241-55C834FD9970}" type="datetimeFigureOut">
               <a:rPr lang="it-IT" smtClean="0"/>
               <a:pPr/>
-              <a:t>22/05/20</a:t>
+              <a:t>04/06/20</a:t>
             </a:fld>
             <a:endParaRPr lang="it-IT" dirty="0"/>
           </a:p>
@@ -2392,7 +2392,7 @@
             <a:fld id="{4B6055F8-1D02-4417-9241-55C834FD9970}" type="datetimeFigureOut">
               <a:rPr lang="it-IT" smtClean="0"/>
               <a:pPr/>
-              <a:t>22/05/20</a:t>
+              <a:t>04/06/20</a:t>
             </a:fld>
             <a:endParaRPr lang="it-IT" dirty="0"/>
           </a:p>
@@ -2484,7 +2484,7 @@
             <a:fld id="{4B6055F8-1D02-4417-9241-55C834FD9970}" type="datetimeFigureOut">
               <a:rPr lang="it-IT" smtClean="0"/>
               <a:pPr/>
-              <a:t>22/05/20</a:t>
+              <a:t>04/06/20</a:t>
             </a:fld>
             <a:endParaRPr lang="it-IT" dirty="0"/>
           </a:p>
@@ -2756,7 +2756,7 @@
             <a:fld id="{4B6055F8-1D02-4417-9241-55C834FD9970}" type="datetimeFigureOut">
               <a:rPr lang="it-IT" smtClean="0"/>
               <a:pPr/>
-              <a:t>22/05/20</a:t>
+              <a:t>04/06/20</a:t>
             </a:fld>
             <a:endParaRPr lang="it-IT" dirty="0"/>
           </a:p>
@@ -3005,7 +3005,7 @@
             <a:fld id="{4B6055F8-1D02-4417-9241-55C834FD9970}" type="datetimeFigureOut">
               <a:rPr lang="it-IT" smtClean="0"/>
               <a:pPr/>
-              <a:t>22/05/20</a:t>
+              <a:t>04/06/20</a:t>
             </a:fld>
             <a:endParaRPr lang="it-IT" dirty="0"/>
           </a:p>
@@ -3213,7 +3213,7 @@
             <a:fld id="{4B6055F8-1D02-4417-9241-55C834FD9970}" type="datetimeFigureOut">
               <a:rPr lang="it-IT" smtClean="0"/>
               <a:pPr/>
-              <a:t>22/05/20</a:t>
+              <a:t>04/06/20</a:t>
             </a:fld>
             <a:endParaRPr lang="it-IT" dirty="0"/>
           </a:p>
@@ -7120,7 +7120,7 @@
         </p:nvGrpSpPr>
         <p:grpSpPr>
           <a:xfrm rot="14226938">
-            <a:off x="7591310" y="4162786"/>
+            <a:off x="7492466" y="4139887"/>
             <a:ext cx="95067" cy="347931"/>
             <a:chOff x="8907440" y="1542101"/>
             <a:chExt cx="95067" cy="347931"/>
@@ -7552,7 +7552,7 @@
         </p:nvSpPr>
         <p:spPr>
           <a:xfrm>
-            <a:off x="7092321" y="4409207"/>
+            <a:off x="7032146" y="4386966"/>
             <a:ext cx="611753" cy="184666"/>
           </a:xfrm>
           <a:prstGeom prst="rect">
@@ -8005,6 +8005,163 @@
                 <a:cs typeface="Times New Roman" pitchFamily="18" charset="0"/>
               </a:rPr>
               <a:t>Categoria</a:t>
+            </a:r>
+          </a:p>
+        </p:txBody>
+      </p:sp>
+      <p:grpSp>
+        <p:nvGrpSpPr>
+          <p:cNvPr id="112" name="Gruppo 111">
+            <a:extLst>
+              <a:ext uri="{FF2B5EF4-FFF2-40B4-BE49-F238E27FC236}">
+                <a16:creationId xmlns:a16="http://schemas.microsoft.com/office/drawing/2014/main" id="{7DCC3F20-4A97-BE47-A27D-15C8662754D9}"/>
+              </a:ext>
+            </a:extLst>
+          </p:cNvPr>
+          <p:cNvGrpSpPr/>
+          <p:nvPr/>
+        </p:nvGrpSpPr>
+        <p:grpSpPr>
+          <a:xfrm rot="12368899">
+            <a:off x="7782727" y="4198082"/>
+            <a:ext cx="95067" cy="347931"/>
+            <a:chOff x="8907440" y="1542101"/>
+            <a:chExt cx="95067" cy="347931"/>
+          </a:xfrm>
+        </p:grpSpPr>
+        <p:cxnSp>
+          <p:nvCxnSpPr>
+            <p:cNvPr id="113" name="Connettore 1 112">
+              <a:extLst>
+                <a:ext uri="{FF2B5EF4-FFF2-40B4-BE49-F238E27FC236}">
+                  <a16:creationId xmlns:a16="http://schemas.microsoft.com/office/drawing/2014/main" id="{EBF7042D-8EDA-F147-9F89-4CC93B3BB6B6}"/>
+                </a:ext>
+              </a:extLst>
+            </p:cNvPr>
+            <p:cNvCxnSpPr>
+              <a:cxnSpLocks/>
+            </p:cNvCxnSpPr>
+            <p:nvPr/>
+          </p:nvCxnSpPr>
+          <p:spPr>
+            <a:xfrm rot="20196749" flipV="1">
+              <a:off x="8949342" y="1610778"/>
+              <a:ext cx="53165" cy="279254"/>
+            </a:xfrm>
+            <a:prstGeom prst="line">
+              <a:avLst/>
+            </a:prstGeom>
+            <a:ln>
+              <a:solidFill>
+                <a:schemeClr val="tx1"/>
+              </a:solidFill>
+            </a:ln>
+          </p:spPr>
+          <p:style>
+            <a:lnRef idx="1">
+              <a:schemeClr val="accent1"/>
+            </a:lnRef>
+            <a:fillRef idx="0">
+              <a:schemeClr val="accent1"/>
+            </a:fillRef>
+            <a:effectRef idx="0">
+              <a:schemeClr val="accent1"/>
+            </a:effectRef>
+            <a:fontRef idx="minor">
+              <a:schemeClr val="tx1"/>
+            </a:fontRef>
+          </p:style>
+        </p:cxnSp>
+        <p:sp>
+          <p:nvSpPr>
+            <p:cNvPr id="115" name="Ovale 114">
+              <a:extLst>
+                <a:ext uri="{FF2B5EF4-FFF2-40B4-BE49-F238E27FC236}">
+                  <a16:creationId xmlns:a16="http://schemas.microsoft.com/office/drawing/2014/main" id="{FD67438F-0F26-0748-8C97-E7847418CCF8}"/>
+                </a:ext>
+              </a:extLst>
+            </p:cNvPr>
+            <p:cNvSpPr/>
+            <p:nvPr/>
+          </p:nvSpPr>
+          <p:spPr>
+            <a:xfrm rot="465190">
+              <a:off x="8907440" y="1542101"/>
+              <a:ext cx="71438" cy="71438"/>
+            </a:xfrm>
+            <a:prstGeom prst="ellipse">
+              <a:avLst/>
+            </a:prstGeom>
+            <a:solidFill>
+              <a:schemeClr val="bg1"/>
+            </a:solidFill>
+            <a:ln w="3175">
+              <a:solidFill>
+                <a:schemeClr val="tx1"/>
+              </a:solidFill>
+            </a:ln>
+          </p:spPr>
+          <p:style>
+            <a:lnRef idx="2">
+              <a:schemeClr val="accent1">
+                <a:shade val="50000"/>
+              </a:schemeClr>
+            </a:lnRef>
+            <a:fillRef idx="1">
+              <a:schemeClr val="accent1"/>
+            </a:fillRef>
+            <a:effectRef idx="0">
+              <a:schemeClr val="accent1"/>
+            </a:effectRef>
+            <a:fontRef idx="minor">
+              <a:schemeClr val="lt1"/>
+            </a:fontRef>
+          </p:style>
+          <p:txBody>
+            <a:bodyPr rtlCol="0" anchor="ctr"/>
+            <a:lstStyle/>
+            <a:p>
+              <a:pPr algn="ctr"/>
+              <a:endParaRPr lang="it-IT" dirty="0"/>
+            </a:p>
+          </p:txBody>
+        </p:sp>
+      </p:grpSp>
+      <p:sp>
+        <p:nvSpPr>
+          <p:cNvPr id="119" name="CasellaDiTesto 118">
+            <a:extLst>
+              <a:ext uri="{FF2B5EF4-FFF2-40B4-BE49-F238E27FC236}">
+                <a16:creationId xmlns:a16="http://schemas.microsoft.com/office/drawing/2014/main" id="{CFA9F713-8E16-AA42-90FD-31040A1EDAC9}"/>
+              </a:ext>
+            </a:extLst>
+          </p:cNvPr>
+          <p:cNvSpPr txBox="1"/>
+          <p:nvPr/>
+        </p:nvSpPr>
+        <p:spPr>
+          <a:xfrm>
+            <a:off x="7527553" y="4497475"/>
+            <a:ext cx="501236" cy="184666"/>
+          </a:xfrm>
+          <a:prstGeom prst="rect">
+            <a:avLst/>
+          </a:prstGeom>
+          <a:noFill/>
+        </p:spPr>
+        <p:txBody>
+          <a:bodyPr wrap="square" rtlCol="0">
+            <a:spAutoFit/>
+          </a:bodyPr>
+          <a:lstStyle/>
+          <a:p>
+            <a:pPr algn="ctr"/>
+            <a:r>
+              <a:rPr lang="it-IT" sz="600" dirty="0">
+                <a:latin typeface="Times New Roman" pitchFamily="18" charset="0"/>
+                <a:cs typeface="Times New Roman" pitchFamily="18" charset="0"/>
+              </a:rPr>
+              <a:t>Email</a:t>
             </a:r>
           </a:p>
         </p:txBody>

</xml_diff>

<commit_message>
aggiunto campo id tabella user
</commit_message>
<xml_diff>
--- a/revisione_1/schema E-R.pptx
+++ b/revisione_1/schema E-R.pptx
@@ -226,7 +226,7 @@
             <a:fld id="{DF8E4867-69EA-41F6-8C06-E5B3EDBB3F96}" type="datetimeFigureOut">
               <a:rPr lang="it-IT" smtClean="0"/>
               <a:pPr/>
-              <a:t>04/06/20</a:t>
+              <a:t>06/06/20</a:t>
             </a:fld>
             <a:endParaRPr lang="it-IT" dirty="0"/>
           </a:p>
@@ -388,7 +388,7 @@
             <a:fld id="{C28A59B8-8CA0-4427-80CD-4F99FE62DFCE}" type="datetimeFigureOut">
               <a:rPr lang="it-IT" smtClean="0"/>
               <a:pPr/>
-              <a:t>04/06/20</a:t>
+              <a:t>06/06/20</a:t>
             </a:fld>
             <a:endParaRPr lang="it-IT" dirty="0"/>
           </a:p>
@@ -833,7 +833,7 @@
             <a:fld id="{4B6055F8-1D02-4417-9241-55C834FD9970}" type="datetimeFigureOut">
               <a:rPr lang="it-IT" smtClean="0"/>
               <a:pPr/>
-              <a:t>04/06/20</a:t>
+              <a:t>06/06/20</a:t>
             </a:fld>
             <a:endParaRPr lang="it-IT" dirty="0"/>
           </a:p>
@@ -998,7 +998,7 @@
             <a:fld id="{4B6055F8-1D02-4417-9241-55C834FD9970}" type="datetimeFigureOut">
               <a:rPr lang="it-IT" smtClean="0"/>
               <a:pPr/>
-              <a:t>04/06/20</a:t>
+              <a:t>06/06/20</a:t>
             </a:fld>
             <a:endParaRPr lang="it-IT" dirty="0"/>
           </a:p>
@@ -1173,7 +1173,7 @@
             <a:fld id="{4B6055F8-1D02-4417-9241-55C834FD9970}" type="datetimeFigureOut">
               <a:rPr lang="it-IT" smtClean="0"/>
               <a:pPr/>
-              <a:t>04/06/20</a:t>
+              <a:t>06/06/20</a:t>
             </a:fld>
             <a:endParaRPr lang="it-IT" dirty="0"/>
           </a:p>
@@ -1338,7 +1338,7 @@
             <a:fld id="{4B6055F8-1D02-4417-9241-55C834FD9970}" type="datetimeFigureOut">
               <a:rPr lang="it-IT" smtClean="0"/>
               <a:pPr/>
-              <a:t>04/06/20</a:t>
+              <a:t>06/06/20</a:t>
             </a:fld>
             <a:endParaRPr lang="it-IT" dirty="0"/>
           </a:p>
@@ -1580,7 +1580,7 @@
             <a:fld id="{4B6055F8-1D02-4417-9241-55C834FD9970}" type="datetimeFigureOut">
               <a:rPr lang="it-IT" smtClean="0"/>
               <a:pPr/>
-              <a:t>04/06/20</a:t>
+              <a:t>06/06/20</a:t>
             </a:fld>
             <a:endParaRPr lang="it-IT" dirty="0"/>
           </a:p>
@@ -1862,7 +1862,7 @@
             <a:fld id="{4B6055F8-1D02-4417-9241-55C834FD9970}" type="datetimeFigureOut">
               <a:rPr lang="it-IT" smtClean="0"/>
               <a:pPr/>
-              <a:t>04/06/20</a:t>
+              <a:t>06/06/20</a:t>
             </a:fld>
             <a:endParaRPr lang="it-IT" dirty="0"/>
           </a:p>
@@ -2278,7 +2278,7 @@
             <a:fld id="{4B6055F8-1D02-4417-9241-55C834FD9970}" type="datetimeFigureOut">
               <a:rPr lang="it-IT" smtClean="0"/>
               <a:pPr/>
-              <a:t>04/06/20</a:t>
+              <a:t>06/06/20</a:t>
             </a:fld>
             <a:endParaRPr lang="it-IT" dirty="0"/>
           </a:p>
@@ -2392,7 +2392,7 @@
             <a:fld id="{4B6055F8-1D02-4417-9241-55C834FD9970}" type="datetimeFigureOut">
               <a:rPr lang="it-IT" smtClean="0"/>
               <a:pPr/>
-              <a:t>04/06/20</a:t>
+              <a:t>06/06/20</a:t>
             </a:fld>
             <a:endParaRPr lang="it-IT" dirty="0"/>
           </a:p>
@@ -2484,7 +2484,7 @@
             <a:fld id="{4B6055F8-1D02-4417-9241-55C834FD9970}" type="datetimeFigureOut">
               <a:rPr lang="it-IT" smtClean="0"/>
               <a:pPr/>
-              <a:t>04/06/20</a:t>
+              <a:t>06/06/20</a:t>
             </a:fld>
             <a:endParaRPr lang="it-IT" dirty="0"/>
           </a:p>
@@ -2756,7 +2756,7 @@
             <a:fld id="{4B6055F8-1D02-4417-9241-55C834FD9970}" type="datetimeFigureOut">
               <a:rPr lang="it-IT" smtClean="0"/>
               <a:pPr/>
-              <a:t>04/06/20</a:t>
+              <a:t>06/06/20</a:t>
             </a:fld>
             <a:endParaRPr lang="it-IT" dirty="0"/>
           </a:p>
@@ -3005,7 +3005,7 @@
             <a:fld id="{4B6055F8-1D02-4417-9241-55C834FD9970}" type="datetimeFigureOut">
               <a:rPr lang="it-IT" smtClean="0"/>
               <a:pPr/>
-              <a:t>04/06/20</a:t>
+              <a:t>06/06/20</a:t>
             </a:fld>
             <a:endParaRPr lang="it-IT" dirty="0"/>
           </a:p>
@@ -3213,7 +3213,7 @@
             <a:fld id="{4B6055F8-1D02-4417-9241-55C834FD9970}" type="datetimeFigureOut">
               <a:rPr lang="it-IT" smtClean="0"/>
               <a:pPr/>
-              <a:t>04/06/20</a:t>
+              <a:t>06/06/20</a:t>
             </a:fld>
             <a:endParaRPr lang="it-IT" dirty="0"/>
           </a:p>
@@ -5552,16 +5552,12 @@
           <a:p>
             <a:pPr algn="ctr"/>
             <a:r>
-              <a:rPr lang="it-IT" sz="600" dirty="0" err="1">
+              <a:rPr lang="it-IT" sz="600" dirty="0">
                 <a:latin typeface="Times New Roman" pitchFamily="18" charset="0"/>
                 <a:cs typeface="Times New Roman" pitchFamily="18" charset="0"/>
               </a:rPr>
               <a:t>DescrizioneBreve</a:t>
             </a:r>
-            <a:endParaRPr lang="it-IT" sz="600" dirty="0">
-              <a:latin typeface="Times New Roman" pitchFamily="18" charset="0"/>
-              <a:cs typeface="Times New Roman" pitchFamily="18" charset="0"/>
-            </a:endParaRPr>
           </a:p>
         </p:txBody>
       </p:sp>
@@ -5722,18 +5718,11 @@
           <a:p>
             <a:pPr algn="ctr"/>
             <a:r>
-              <a:rPr lang="it-IT" sz="600" dirty="0" err="1">
-                <a:latin typeface="Times New Roman" pitchFamily="18" charset="0"/>
-                <a:cs typeface="Times New Roman" pitchFamily="18" charset="0"/>
-              </a:rPr>
-              <a:t>Flag</a:t>
-            </a:r>
-            <a:r>
               <a:rPr lang="it-IT" sz="600" dirty="0">
                 <a:latin typeface="Times New Roman" pitchFamily="18" charset="0"/>
                 <a:cs typeface="Times New Roman" pitchFamily="18" charset="0"/>
               </a:rPr>
-              <a:t> Sconto</a:t>
+              <a:t>Flag Sconto</a:t>
             </a:r>
           </a:p>
         </p:txBody>
@@ -5963,7 +5952,7 @@
               <a:avLst/>
             </a:prstGeom>
             <a:solidFill>
-              <a:schemeClr val="tx1"/>
+              <a:schemeClr val="bg1"/>
             </a:solidFill>
             <a:ln w="3175">
               <a:solidFill>
@@ -8166,6 +8155,161 @@
           </a:p>
         </p:txBody>
       </p:sp>
+      <p:grpSp>
+        <p:nvGrpSpPr>
+          <p:cNvPr id="2" name="Gruppo 1">
+            <a:extLst>
+              <a:ext uri="{FF2B5EF4-FFF2-40B4-BE49-F238E27FC236}">
+                <a16:creationId xmlns:a16="http://schemas.microsoft.com/office/drawing/2014/main" id="{2394B0CE-9361-9342-9C7B-5CE49866096B}"/>
+              </a:ext>
+            </a:extLst>
+          </p:cNvPr>
+          <p:cNvGrpSpPr/>
+          <p:nvPr/>
+        </p:nvGrpSpPr>
+        <p:grpSpPr>
+          <a:xfrm rot="19889048">
+            <a:off x="8030794" y="4207302"/>
+            <a:ext cx="566487" cy="424285"/>
+            <a:chOff x="7760072" y="5870619"/>
+            <a:chExt cx="566487" cy="424285"/>
+          </a:xfrm>
+        </p:grpSpPr>
+        <p:cxnSp>
+          <p:nvCxnSpPr>
+            <p:cNvPr id="116" name="Connettore 1 115">
+              <a:extLst>
+                <a:ext uri="{FF2B5EF4-FFF2-40B4-BE49-F238E27FC236}">
+                  <a16:creationId xmlns:a16="http://schemas.microsoft.com/office/drawing/2014/main" id="{95D576EB-6A0E-CF4D-95C2-8D8A405796DE}"/>
+                </a:ext>
+              </a:extLst>
+            </p:cNvPr>
+            <p:cNvCxnSpPr/>
+            <p:nvPr/>
+          </p:nvCxnSpPr>
+          <p:spPr>
+            <a:xfrm rot="5400000" flipH="1" flipV="1">
+              <a:off x="7983871" y="5942057"/>
+              <a:ext cx="214314" cy="71438"/>
+            </a:xfrm>
+            <a:prstGeom prst="line">
+              <a:avLst/>
+            </a:prstGeom>
+            <a:ln>
+              <a:solidFill>
+                <a:schemeClr val="tx1"/>
+              </a:solidFill>
+            </a:ln>
+          </p:spPr>
+          <p:style>
+            <a:lnRef idx="1">
+              <a:schemeClr val="accent1"/>
+            </a:lnRef>
+            <a:fillRef idx="0">
+              <a:schemeClr val="accent1"/>
+            </a:fillRef>
+            <a:effectRef idx="0">
+              <a:schemeClr val="accent1"/>
+            </a:effectRef>
+            <a:fontRef idx="minor">
+              <a:schemeClr val="tx1"/>
+            </a:fontRef>
+          </p:style>
+        </p:cxnSp>
+        <p:sp>
+          <p:nvSpPr>
+            <p:cNvPr id="117" name="Ovale 116">
+              <a:extLst>
+                <a:ext uri="{FF2B5EF4-FFF2-40B4-BE49-F238E27FC236}">
+                  <a16:creationId xmlns:a16="http://schemas.microsoft.com/office/drawing/2014/main" id="{1B13FD32-C42A-1B48-B469-23A65F57C013}"/>
+                </a:ext>
+              </a:extLst>
+            </p:cNvPr>
+            <p:cNvSpPr/>
+            <p:nvPr/>
+          </p:nvSpPr>
+          <p:spPr>
+            <a:xfrm>
+              <a:off x="8011187" y="6080651"/>
+              <a:ext cx="71438" cy="71438"/>
+            </a:xfrm>
+            <a:prstGeom prst="ellipse">
+              <a:avLst/>
+            </a:prstGeom>
+            <a:solidFill>
+              <a:schemeClr val="tx1"/>
+            </a:solidFill>
+            <a:ln w="3175">
+              <a:solidFill>
+                <a:schemeClr val="tx1"/>
+              </a:solidFill>
+            </a:ln>
+          </p:spPr>
+          <p:style>
+            <a:lnRef idx="2">
+              <a:schemeClr val="accent1">
+                <a:shade val="50000"/>
+              </a:schemeClr>
+            </a:lnRef>
+            <a:fillRef idx="1">
+              <a:schemeClr val="accent1"/>
+            </a:fillRef>
+            <a:effectRef idx="0">
+              <a:schemeClr val="accent1"/>
+            </a:effectRef>
+            <a:fontRef idx="minor">
+              <a:schemeClr val="lt1"/>
+            </a:fontRef>
+          </p:style>
+          <p:txBody>
+            <a:bodyPr rtlCol="0" anchor="ctr"/>
+            <a:lstStyle/>
+            <a:p>
+              <a:pPr algn="ctr"/>
+              <a:endParaRPr lang="it-IT" dirty="0"/>
+            </a:p>
+          </p:txBody>
+        </p:sp>
+        <p:sp>
+          <p:nvSpPr>
+            <p:cNvPr id="118" name="CasellaDiTesto 117">
+              <a:extLst>
+                <a:ext uri="{FF2B5EF4-FFF2-40B4-BE49-F238E27FC236}">
+                  <a16:creationId xmlns:a16="http://schemas.microsoft.com/office/drawing/2014/main" id="{E457340F-353E-1E46-A809-4F8AE302A865}"/>
+                </a:ext>
+              </a:extLst>
+            </p:cNvPr>
+            <p:cNvSpPr txBox="1"/>
+            <p:nvPr/>
+          </p:nvSpPr>
+          <p:spPr>
+            <a:xfrm rot="1710952">
+              <a:off x="7760072" y="6110238"/>
+              <a:ext cx="566487" cy="184666"/>
+            </a:xfrm>
+            <a:prstGeom prst="rect">
+              <a:avLst/>
+            </a:prstGeom>
+            <a:noFill/>
+          </p:spPr>
+          <p:txBody>
+            <a:bodyPr wrap="square" rtlCol="0">
+              <a:spAutoFit/>
+            </a:bodyPr>
+            <a:lstStyle/>
+            <a:p>
+              <a:pPr algn="ctr"/>
+              <a:r>
+                <a:rPr lang="it-IT" sz="600" dirty="0">
+                  <a:latin typeface="Times New Roman" pitchFamily="18" charset="0"/>
+                  <a:cs typeface="Times New Roman" pitchFamily="18" charset="0"/>
+                </a:rPr>
+                <a:t>Id</a:t>
+              </a:r>
+            </a:p>
+          </p:txBody>
+        </p:sp>
+      </p:grpSp>
     </p:spTree>
   </p:cSld>
   <p:clrMapOvr>

</xml_diff>